<commit_message>
mostly done. Needs selection screen, QR screen, and expo screen
</commit_message>
<xml_diff>
--- a/presentation/civic_duty_presentation_final.pptx
+++ b/presentation/civic_duty_presentation_final.pptx
@@ -5,10 +5,10 @@
     <p:sldMasterId id="2147483684" r:id="rId1"/>
   </p:sldMasterIdLst>
   <p:notesMasterIdLst>
-    <p:notesMasterId r:id="rId21"/>
+    <p:notesMasterId r:id="rId23"/>
   </p:notesMasterIdLst>
   <p:handoutMasterIdLst>
-    <p:handoutMasterId r:id="rId22"/>
+    <p:handoutMasterId r:id="rId24"/>
   </p:handoutMasterIdLst>
   <p:sldIdLst>
     <p:sldId id="280" r:id="rId2"/>
@@ -24,12 +24,14 @@
     <p:sldId id="288" r:id="rId12"/>
     <p:sldId id="289" r:id="rId13"/>
     <p:sldId id="290" r:id="rId14"/>
-    <p:sldId id="291" r:id="rId15"/>
-    <p:sldId id="292" r:id="rId16"/>
-    <p:sldId id="293" r:id="rId17"/>
-    <p:sldId id="294" r:id="rId18"/>
-    <p:sldId id="295" r:id="rId19"/>
-    <p:sldId id="296" r:id="rId20"/>
+    <p:sldId id="300" r:id="rId15"/>
+    <p:sldId id="301" r:id="rId16"/>
+    <p:sldId id="291" r:id="rId17"/>
+    <p:sldId id="292" r:id="rId18"/>
+    <p:sldId id="293" r:id="rId19"/>
+    <p:sldId id="294" r:id="rId20"/>
+    <p:sldId id="295" r:id="rId21"/>
+    <p:sldId id="296" r:id="rId22"/>
   </p:sldIdLst>
   <p:sldSz cx="12192000" cy="6858000"/>
   <p:notesSz cx="6858000" cy="9144000"/>
@@ -5287,84 +5289,751 @@
           </a:p>
         </p:txBody>
       </p:sp>
-      <p:sp>
-        <p:nvSpPr>
-          <p:cNvPr id="3" name="Content Placeholder 2"/>
-          <p:cNvSpPr>
-            <a:spLocks noGrp="1"/>
-          </p:cNvSpPr>
+      <p:pic>
+        <p:nvPicPr>
+          <p:cNvPr id="4" name="Content Placeholder 3"/>
+          <p:cNvPicPr>
+            <a:picLocks noGrp="1" noChangeAspect="1"/>
+          </p:cNvPicPr>
           <p:nvPr>
             <p:ph sz="quarter" idx="1"/>
           </p:nvPr>
-        </p:nvSpPr>
+        </p:nvPicPr>
+        <p:blipFill>
+          <a:blip r:embed="rId2">
+            <a:extLst>
+              <a:ext uri="{28A0092B-C50C-407E-A947-70E740481C1C}">
+                <a14:useLocalDpi xmlns:a14="http://schemas.microsoft.com/office/drawing/2010/main" val="0"/>
+              </a:ext>
+            </a:extLst>
+          </a:blip>
+          <a:stretch>
+            <a:fillRect/>
+          </a:stretch>
+        </p:blipFill>
         <p:spPr>
           <a:xfrm>
-            <a:off x="1219200" y="1447800"/>
-            <a:ext cx="10363200" cy="4811332"/>
-          </a:xfrm>
-        </p:spPr>
-        <p:txBody>
-          <a:bodyPr>
-            <a:normAutofit/>
+            <a:off x="4555051" y="3282389"/>
+            <a:ext cx="1149249" cy="1149249"/>
+          </a:xfrm>
+        </p:spPr>
+      </p:pic>
+      <p:pic>
+        <p:nvPicPr>
+          <p:cNvPr id="5" name="Picture 4"/>
+          <p:cNvPicPr>
+            <a:picLocks noChangeAspect="1"/>
+          </p:cNvPicPr>
+          <p:nvPr/>
+        </p:nvPicPr>
+        <p:blipFill>
+          <a:blip r:embed="rId3">
+            <a:extLst>
+              <a:ext uri="{28A0092B-C50C-407E-A947-70E740481C1C}">
+                <a14:useLocalDpi xmlns:a14="http://schemas.microsoft.com/office/drawing/2010/main" val="0"/>
+              </a:ext>
+            </a:extLst>
+          </a:blip>
+          <a:stretch>
+            <a:fillRect/>
+          </a:stretch>
+        </p:blipFill>
+        <p:spPr>
+          <a:xfrm>
+            <a:off x="1735178" y="2181918"/>
+            <a:ext cx="1061403" cy="1061403"/>
+          </a:xfrm>
+          <a:prstGeom prst="rect">
+            <a:avLst/>
+          </a:prstGeom>
+        </p:spPr>
+      </p:pic>
+      <p:pic>
+        <p:nvPicPr>
+          <p:cNvPr id="6" name="Picture 5"/>
+          <p:cNvPicPr>
+            <a:picLocks noChangeAspect="1"/>
+          </p:cNvPicPr>
+          <p:nvPr/>
+        </p:nvPicPr>
+        <p:blipFill>
+          <a:blip r:embed="rId4">
+            <a:extLst>
+              <a:ext uri="{28A0092B-C50C-407E-A947-70E740481C1C}">
+                <a14:useLocalDpi xmlns:a14="http://schemas.microsoft.com/office/drawing/2010/main" val="0"/>
+              </a:ext>
+            </a:extLst>
+          </a:blip>
+          <a:stretch>
+            <a:fillRect/>
+          </a:stretch>
+        </p:blipFill>
+        <p:spPr>
+          <a:xfrm>
+            <a:off x="6642678" y="5001408"/>
+            <a:ext cx="1163003" cy="1163003"/>
+          </a:xfrm>
+          <a:prstGeom prst="rect">
+            <a:avLst/>
+          </a:prstGeom>
+        </p:spPr>
+      </p:pic>
+      <p:pic>
+        <p:nvPicPr>
+          <p:cNvPr id="7" name="Picture 6"/>
+          <p:cNvPicPr>
+            <a:picLocks noChangeAspect="1"/>
+          </p:cNvPicPr>
+          <p:nvPr/>
+        </p:nvPicPr>
+        <p:blipFill>
+          <a:blip r:embed="rId5" cstate="print">
+            <a:extLst>
+              <a:ext uri="{28A0092B-C50C-407E-A947-70E740481C1C}">
+                <a14:useLocalDpi xmlns:a14="http://schemas.microsoft.com/office/drawing/2010/main" val="0"/>
+              </a:ext>
+            </a:extLst>
+          </a:blip>
+          <a:stretch>
+            <a:fillRect/>
+          </a:stretch>
+        </p:blipFill>
+        <p:spPr>
+          <a:xfrm>
+            <a:off x="9434216" y="5094197"/>
+            <a:ext cx="2148184" cy="977424"/>
+          </a:xfrm>
+          <a:prstGeom prst="rect">
+            <a:avLst/>
+          </a:prstGeom>
+        </p:spPr>
+      </p:pic>
+      <p:pic>
+        <p:nvPicPr>
+          <p:cNvPr id="8" name="Picture 7"/>
+          <p:cNvPicPr>
+            <a:picLocks noChangeAspect="1"/>
+          </p:cNvPicPr>
+          <p:nvPr/>
+        </p:nvPicPr>
+        <p:blipFill>
+          <a:blip r:embed="rId6">
+            <a:extLst>
+              <a:ext uri="{28A0092B-C50C-407E-A947-70E740481C1C}">
+                <a14:useLocalDpi xmlns:a14="http://schemas.microsoft.com/office/drawing/2010/main" val="0"/>
+              </a:ext>
+            </a:extLst>
+          </a:blip>
+          <a:stretch>
+            <a:fillRect/>
+          </a:stretch>
+        </p:blipFill>
+        <p:spPr>
+          <a:xfrm>
+            <a:off x="9698059" y="1093493"/>
+            <a:ext cx="1620498" cy="1620498"/>
+          </a:xfrm>
+          <a:prstGeom prst="rect">
+            <a:avLst/>
+          </a:prstGeom>
+        </p:spPr>
+      </p:pic>
+      <p:pic>
+        <p:nvPicPr>
+          <p:cNvPr id="9" name="Picture 8"/>
+          <p:cNvPicPr>
+            <a:picLocks noChangeAspect="1"/>
+          </p:cNvPicPr>
+          <p:nvPr/>
+        </p:nvPicPr>
+        <p:blipFill>
+          <a:blip r:embed="rId7">
+            <a:extLst>
+              <a:ext uri="{28A0092B-C50C-407E-A947-70E740481C1C}">
+                <a14:useLocalDpi xmlns:a14="http://schemas.microsoft.com/office/drawing/2010/main" val="0"/>
+              </a:ext>
+            </a:extLst>
+          </a:blip>
+          <a:stretch>
+            <a:fillRect/>
+          </a:stretch>
+        </p:blipFill>
+        <p:spPr>
+          <a:xfrm>
+            <a:off x="6773648" y="1417638"/>
+            <a:ext cx="901065" cy="901065"/>
+          </a:xfrm>
+          <a:prstGeom prst="rect">
+            <a:avLst/>
+          </a:prstGeom>
+        </p:spPr>
+      </p:pic>
+      <p:pic>
+        <p:nvPicPr>
+          <p:cNvPr id="10" name="Picture 9"/>
+          <p:cNvPicPr>
+            <a:picLocks noChangeAspect="1"/>
+          </p:cNvPicPr>
+          <p:nvPr/>
+        </p:nvPicPr>
+        <p:blipFill>
+          <a:blip r:embed="rId8">
+            <a:extLst>
+              <a:ext uri="{28A0092B-C50C-407E-A947-70E740481C1C}">
+                <a14:useLocalDpi xmlns:a14="http://schemas.microsoft.com/office/drawing/2010/main" val="0"/>
+              </a:ext>
+            </a:extLst>
+          </a:blip>
+          <a:stretch>
+            <a:fillRect/>
+          </a:stretch>
+        </p:blipFill>
+        <p:spPr>
+          <a:xfrm>
+            <a:off x="1980171" y="4925060"/>
+            <a:ext cx="1351745" cy="1315698"/>
+          </a:xfrm>
+          <a:prstGeom prst="rect">
+            <a:avLst/>
+          </a:prstGeom>
+          <a:ln>
+            <a:solidFill>
+              <a:srgbClr val="0070C0"/>
+            </a:solidFill>
+          </a:ln>
+        </p:spPr>
+      </p:pic>
+      <p:cxnSp>
+        <p:nvCxnSpPr>
+          <p:cNvPr id="16" name="Straight Arrow Connector 15"/>
+          <p:cNvCxnSpPr/>
+          <p:nvPr/>
+        </p:nvCxnSpPr>
+        <p:spPr>
+          <a:xfrm flipH="1" flipV="1">
+            <a:off x="9917287" y="2712620"/>
+            <a:ext cx="6642" cy="2381577"/>
+          </a:xfrm>
+          <a:prstGeom prst="straightConnector1">
+            <a:avLst/>
+          </a:prstGeom>
+          <a:ln>
+            <a:solidFill>
+              <a:srgbClr val="0070C0"/>
+            </a:solidFill>
+            <a:tailEnd type="triangle"/>
+          </a:ln>
+        </p:spPr>
+        <p:style>
+          <a:lnRef idx="1">
+            <a:schemeClr val="accent1"/>
+          </a:lnRef>
+          <a:fillRef idx="0">
+            <a:schemeClr val="accent1"/>
+          </a:fillRef>
+          <a:effectRef idx="0">
+            <a:schemeClr val="accent1"/>
+          </a:effectRef>
+          <a:fontRef idx="minor">
+            <a:schemeClr val="tx1"/>
+          </a:fontRef>
+        </p:style>
+      </p:cxnSp>
+      <p:cxnSp>
+        <p:nvCxnSpPr>
+          <p:cNvPr id="20" name="Straight Arrow Connector 19"/>
+          <p:cNvCxnSpPr/>
+          <p:nvPr/>
+        </p:nvCxnSpPr>
+        <p:spPr>
+          <a:xfrm>
+            <a:off x="11116443" y="2712620"/>
+            <a:ext cx="17722" cy="2381577"/>
+          </a:xfrm>
+          <a:prstGeom prst="straightConnector1">
+            <a:avLst/>
+          </a:prstGeom>
+          <a:ln>
+            <a:solidFill>
+              <a:srgbClr val="0070C0"/>
+            </a:solidFill>
+            <a:tailEnd type="triangle"/>
+          </a:ln>
+        </p:spPr>
+        <p:style>
+          <a:lnRef idx="1">
+            <a:schemeClr val="accent1"/>
+          </a:lnRef>
+          <a:fillRef idx="0">
+            <a:schemeClr val="accent1"/>
+          </a:fillRef>
+          <a:effectRef idx="0">
+            <a:schemeClr val="accent1"/>
+          </a:effectRef>
+          <a:fontRef idx="minor">
+            <a:schemeClr val="tx1"/>
+          </a:fontRef>
+        </p:style>
+      </p:cxnSp>
+      <p:cxnSp>
+        <p:nvCxnSpPr>
+          <p:cNvPr id="28" name="Straight Arrow Connector 27"/>
+          <p:cNvCxnSpPr>
+            <a:stCxn id="10" idx="3"/>
+            <a:endCxn id="6" idx="1"/>
+          </p:cNvCxnSpPr>
+          <p:nvPr/>
+        </p:nvCxnSpPr>
+        <p:spPr>
+          <a:xfrm>
+            <a:off x="3331916" y="5582909"/>
+            <a:ext cx="3310762" cy="1"/>
+          </a:xfrm>
+          <a:prstGeom prst="straightConnector1">
+            <a:avLst/>
+          </a:prstGeom>
+          <a:ln>
+            <a:solidFill>
+              <a:srgbClr val="00B0F0"/>
+            </a:solidFill>
+            <a:tailEnd type="triangle"/>
+          </a:ln>
+        </p:spPr>
+        <p:style>
+          <a:lnRef idx="1">
+            <a:schemeClr val="accent1"/>
+          </a:lnRef>
+          <a:fillRef idx="0">
+            <a:schemeClr val="accent1"/>
+          </a:fillRef>
+          <a:effectRef idx="0">
+            <a:schemeClr val="accent1"/>
+          </a:effectRef>
+          <a:fontRef idx="minor">
+            <a:schemeClr val="tx1"/>
+          </a:fontRef>
+        </p:style>
+      </p:cxnSp>
+      <p:sp>
+        <p:nvSpPr>
+          <p:cNvPr id="30" name="TextBox 29"/>
+          <p:cNvSpPr txBox="1"/>
+          <p:nvPr/>
+        </p:nvSpPr>
+        <p:spPr>
+          <a:xfrm>
+            <a:off x="4275536" y="5306826"/>
+            <a:ext cx="816249" cy="369332"/>
+          </a:xfrm>
+          <a:prstGeom prst="rect">
+            <a:avLst/>
+          </a:prstGeom>
+          <a:noFill/>
+          <a:ln>
+            <a:solidFill>
+              <a:schemeClr val="bg2"/>
+            </a:solidFill>
+          </a:ln>
+        </p:spPr>
+        <p:txBody>
+          <a:bodyPr wrap="none" rtlCol="0" anchor="ctr" anchorCtr="1">
+            <a:spAutoFit/>
           </a:bodyPr>
           <a:lstStyle/>
           <a:p>
             <a:r>
-              <a:rPr lang="en-US" sz="3800" dirty="0" err="1" smtClean="0"/>
-              <a:t>Git</a:t>
-            </a:r>
-            <a:r>
-              <a:rPr lang="en-US" sz="3800" dirty="0" smtClean="0"/>
-              <a:t>/GitHub (version control)</a:t>
-            </a:r>
-          </a:p>
-          <a:p>
-            <a:r>
-              <a:rPr lang="en-US" sz="3800" dirty="0" smtClean="0"/>
-              <a:t>Slack  (communication)</a:t>
-            </a:r>
-          </a:p>
-          <a:p>
-            <a:r>
-              <a:rPr lang="en-US" sz="3800" dirty="0" smtClean="0"/>
-              <a:t>Django (backend)</a:t>
-            </a:r>
-          </a:p>
-          <a:p>
-            <a:r>
-              <a:rPr lang="en-US" sz="3800" dirty="0" smtClean="0"/>
-              <a:t>React Native (frontend)</a:t>
-            </a:r>
-          </a:p>
-          <a:p>
-            <a:r>
-              <a:rPr lang="en-US" sz="3800" dirty="0" smtClean="0"/>
-              <a:t>Expo (phone emulator)</a:t>
-            </a:r>
-          </a:p>
-          <a:p>
-            <a:r>
-              <a:rPr lang="en-US" sz="3800" dirty="0" err="1" smtClean="0"/>
-              <a:t>Heroku</a:t>
-            </a:r>
-            <a:r>
-              <a:rPr lang="en-US" sz="3800" dirty="0" smtClean="0"/>
-              <a:t> (Server)</a:t>
-            </a:r>
-          </a:p>
-          <a:p>
-            <a:r>
-              <a:rPr lang="en-US" sz="3800" dirty="0" smtClean="0"/>
-              <a:t>Adobe XD</a:t>
-            </a:r>
-            <a:r>
-              <a:rPr lang="en-US" sz="3800" dirty="0"/>
-              <a:t> </a:t>
-            </a:r>
-            <a:r>
-              <a:rPr lang="en-US" sz="3800" dirty="0" smtClean="0"/>
-              <a:t>(UI)</a:t>
-            </a:r>
+              <a:rPr lang="en-US" dirty="0" smtClean="0"/>
+              <a:t>Design</a:t>
+            </a:r>
+            <a:endParaRPr lang="en-US" dirty="0"/>
+          </a:p>
+        </p:txBody>
+      </p:sp>
+      <p:cxnSp>
+        <p:nvCxnSpPr>
+          <p:cNvPr id="37" name="Straight Arrow Connector 36"/>
+          <p:cNvCxnSpPr>
+            <a:stCxn id="4" idx="1"/>
+            <a:endCxn id="5" idx="3"/>
+          </p:cNvCxnSpPr>
+          <p:nvPr/>
+        </p:nvCxnSpPr>
+        <p:spPr>
+          <a:xfrm flipH="1" flipV="1">
+            <a:off x="2796581" y="2712620"/>
+            <a:ext cx="1758470" cy="1144394"/>
+          </a:xfrm>
+          <a:prstGeom prst="straightConnector1">
+            <a:avLst/>
+          </a:prstGeom>
+          <a:ln>
+            <a:solidFill>
+              <a:srgbClr val="00B0F0"/>
+            </a:solidFill>
+            <a:tailEnd type="triangle"/>
+          </a:ln>
+        </p:spPr>
+        <p:style>
+          <a:lnRef idx="1">
+            <a:schemeClr val="accent1"/>
+          </a:lnRef>
+          <a:fillRef idx="0">
+            <a:schemeClr val="accent1"/>
+          </a:fillRef>
+          <a:effectRef idx="0">
+            <a:schemeClr val="accent1"/>
+          </a:effectRef>
+          <a:fontRef idx="minor">
+            <a:schemeClr val="tx1"/>
+          </a:fontRef>
+        </p:style>
+      </p:cxnSp>
+      <p:sp>
+        <p:nvSpPr>
+          <p:cNvPr id="38" name="TextBox 37"/>
+          <p:cNvSpPr txBox="1"/>
+          <p:nvPr/>
+        </p:nvSpPr>
+        <p:spPr>
+          <a:xfrm rot="2172106">
+            <a:off x="3186799" y="2920155"/>
+            <a:ext cx="884858" cy="646331"/>
+          </a:xfrm>
+          <a:prstGeom prst="rect">
+            <a:avLst/>
+          </a:prstGeom>
+          <a:noFill/>
+          <a:ln>
+            <a:solidFill>
+              <a:schemeClr val="bg2"/>
+            </a:solidFill>
+          </a:ln>
+        </p:spPr>
+        <p:txBody>
+          <a:bodyPr wrap="none" rtlCol="0" anchor="ctr" anchorCtr="1">
+            <a:spAutoFit/>
+          </a:bodyPr>
+          <a:lstStyle/>
+          <a:p>
+            <a:r>
+              <a:rPr lang="en-US" dirty="0" smtClean="0"/>
+              <a:t>Inform</a:t>
+            </a:r>
+          </a:p>
+          <a:p>
+            <a:r>
+              <a:rPr lang="en-US" dirty="0" smtClean="0"/>
+              <a:t>Change</a:t>
+            </a:r>
+          </a:p>
+        </p:txBody>
+      </p:sp>
+      <p:cxnSp>
+        <p:nvCxnSpPr>
+          <p:cNvPr id="43" name="Straight Arrow Connector 42"/>
+          <p:cNvCxnSpPr>
+            <a:stCxn id="6" idx="0"/>
+            <a:endCxn id="9" idx="2"/>
+          </p:cNvCxnSpPr>
+          <p:nvPr/>
+        </p:nvCxnSpPr>
+        <p:spPr>
+          <a:xfrm flipV="1">
+            <a:off x="7224180" y="2318703"/>
+            <a:ext cx="1" cy="2682705"/>
+          </a:xfrm>
+          <a:prstGeom prst="straightConnector1">
+            <a:avLst/>
+          </a:prstGeom>
+          <a:ln>
+            <a:solidFill>
+              <a:srgbClr val="00B0F0"/>
+            </a:solidFill>
+            <a:tailEnd type="triangle"/>
+          </a:ln>
+        </p:spPr>
+        <p:style>
+          <a:lnRef idx="1">
+            <a:schemeClr val="accent1"/>
+          </a:lnRef>
+          <a:fillRef idx="0">
+            <a:schemeClr val="accent1"/>
+          </a:fillRef>
+          <a:effectRef idx="0">
+            <a:schemeClr val="accent1"/>
+          </a:effectRef>
+          <a:fontRef idx="minor">
+            <a:schemeClr val="tx1"/>
+          </a:fontRef>
+        </p:style>
+      </p:cxnSp>
+      <p:sp>
+        <p:nvSpPr>
+          <p:cNvPr id="44" name="TextBox 43"/>
+          <p:cNvSpPr txBox="1"/>
+          <p:nvPr/>
+        </p:nvSpPr>
+        <p:spPr>
+          <a:xfrm rot="5400000">
+            <a:off x="6993026" y="2817115"/>
+            <a:ext cx="855234" cy="369332"/>
+          </a:xfrm>
+          <a:prstGeom prst="rect">
+            <a:avLst/>
+          </a:prstGeom>
+          <a:noFill/>
+          <a:ln>
+            <a:solidFill>
+              <a:schemeClr val="bg2"/>
+            </a:solidFill>
+          </a:ln>
+        </p:spPr>
+        <p:txBody>
+          <a:bodyPr wrap="none" rtlCol="0" anchor="ctr" anchorCtr="1">
+            <a:spAutoFit/>
+          </a:bodyPr>
+          <a:lstStyle/>
+          <a:p>
+            <a:r>
+              <a:rPr lang="en-US" dirty="0" smtClean="0"/>
+              <a:t>Display</a:t>
+            </a:r>
+            <a:endParaRPr lang="en-US" dirty="0"/>
+          </a:p>
+        </p:txBody>
+      </p:sp>
+      <p:cxnSp>
+        <p:nvCxnSpPr>
+          <p:cNvPr id="46" name="Straight Arrow Connector 45"/>
+          <p:cNvCxnSpPr>
+            <a:stCxn id="7" idx="1"/>
+            <a:endCxn id="6" idx="3"/>
+          </p:cNvCxnSpPr>
+          <p:nvPr/>
+        </p:nvCxnSpPr>
+        <p:spPr>
+          <a:xfrm flipH="1">
+            <a:off x="7805681" y="5582909"/>
+            <a:ext cx="1628535" cy="1"/>
+          </a:xfrm>
+          <a:prstGeom prst="straightConnector1">
+            <a:avLst/>
+          </a:prstGeom>
+          <a:ln>
+            <a:solidFill>
+              <a:srgbClr val="00B0F0"/>
+            </a:solidFill>
+            <a:tailEnd type="triangle"/>
+          </a:ln>
+        </p:spPr>
+        <p:style>
+          <a:lnRef idx="1">
+            <a:schemeClr val="accent1"/>
+          </a:lnRef>
+          <a:fillRef idx="0">
+            <a:schemeClr val="accent1"/>
+          </a:fillRef>
+          <a:effectRef idx="0">
+            <a:schemeClr val="accent1"/>
+          </a:effectRef>
+          <a:fontRef idx="minor">
+            <a:schemeClr val="tx1"/>
+          </a:fontRef>
+        </p:style>
+      </p:cxnSp>
+      <p:sp>
+        <p:nvSpPr>
+          <p:cNvPr id="50" name="TextBox 49"/>
+          <p:cNvSpPr txBox="1"/>
+          <p:nvPr/>
+        </p:nvSpPr>
+        <p:spPr>
+          <a:xfrm>
+            <a:off x="8132988" y="5262603"/>
+            <a:ext cx="973921" cy="369332"/>
+          </a:xfrm>
+          <a:prstGeom prst="rect">
+            <a:avLst/>
+          </a:prstGeom>
+          <a:noFill/>
+          <a:ln>
+            <a:solidFill>
+              <a:schemeClr val="bg2"/>
+            </a:solidFill>
+          </a:ln>
+        </p:spPr>
+        <p:txBody>
+          <a:bodyPr wrap="none" rtlCol="0" anchor="ctr" anchorCtr="1">
+            <a:spAutoFit/>
+          </a:bodyPr>
+          <a:lstStyle/>
+          <a:p>
+            <a:r>
+              <a:rPr lang="en-US" dirty="0" smtClean="0"/>
+              <a:t>Backend</a:t>
+            </a:r>
+            <a:endParaRPr lang="en-US" dirty="0"/>
+          </a:p>
+        </p:txBody>
+      </p:sp>
+      <p:cxnSp>
+        <p:nvCxnSpPr>
+          <p:cNvPr id="52" name="Straight Arrow Connector 51"/>
+          <p:cNvCxnSpPr>
+            <a:stCxn id="6" idx="1"/>
+            <a:endCxn id="4" idx="3"/>
+          </p:cNvCxnSpPr>
+          <p:nvPr/>
+        </p:nvCxnSpPr>
+        <p:spPr>
+          <a:xfrm flipH="1" flipV="1">
+            <a:off x="5704300" y="3857014"/>
+            <a:ext cx="938378" cy="1725896"/>
+          </a:xfrm>
+          <a:prstGeom prst="straightConnector1">
+            <a:avLst/>
+          </a:prstGeom>
+          <a:ln>
+            <a:solidFill>
+              <a:srgbClr val="00B0F0"/>
+            </a:solidFill>
+            <a:tailEnd type="triangle"/>
+          </a:ln>
+        </p:spPr>
+        <p:style>
+          <a:lnRef idx="1">
+            <a:schemeClr val="accent1"/>
+          </a:lnRef>
+          <a:fillRef idx="0">
+            <a:schemeClr val="accent1"/>
+          </a:fillRef>
+          <a:effectRef idx="0">
+            <a:schemeClr val="accent1"/>
+          </a:effectRef>
+          <a:fontRef idx="minor">
+            <a:schemeClr val="tx1"/>
+          </a:fontRef>
+        </p:style>
+      </p:cxnSp>
+      <p:cxnSp>
+        <p:nvCxnSpPr>
+          <p:cNvPr id="55" name="Elbow Connector 54"/>
+          <p:cNvCxnSpPr>
+            <a:endCxn id="4" idx="3"/>
+          </p:cNvCxnSpPr>
+          <p:nvPr/>
+        </p:nvCxnSpPr>
+        <p:spPr>
+          <a:xfrm rot="10800000">
+            <a:off x="5704301" y="3857015"/>
+            <a:ext cx="3717949" cy="1958833"/>
+          </a:xfrm>
+          <a:prstGeom prst="bentConnector3">
+            <a:avLst>
+              <a:gd name="adj1" fmla="val 50000"/>
+            </a:avLst>
+          </a:prstGeom>
+          <a:ln>
+            <a:solidFill>
+              <a:srgbClr val="00B0F0"/>
+            </a:solidFill>
+            <a:tailEnd type="triangle"/>
+          </a:ln>
+        </p:spPr>
+        <p:style>
+          <a:lnRef idx="1">
+            <a:schemeClr val="accent1"/>
+          </a:lnRef>
+          <a:fillRef idx="0">
+            <a:schemeClr val="accent1"/>
+          </a:fillRef>
+          <a:effectRef idx="0">
+            <a:schemeClr val="accent1"/>
+          </a:effectRef>
+          <a:fontRef idx="minor">
+            <a:schemeClr val="tx1"/>
+          </a:fontRef>
+        </p:style>
+      </p:cxnSp>
+      <p:sp>
+        <p:nvSpPr>
+          <p:cNvPr id="64" name="TextBox 63"/>
+          <p:cNvSpPr txBox="1"/>
+          <p:nvPr/>
+        </p:nvSpPr>
+        <p:spPr>
+          <a:xfrm>
+            <a:off x="5692334" y="3508685"/>
+            <a:ext cx="882549" cy="646331"/>
+          </a:xfrm>
+          <a:prstGeom prst="rect">
+            <a:avLst/>
+          </a:prstGeom>
+          <a:noFill/>
+          <a:ln>
+            <a:solidFill>
+              <a:schemeClr val="bg2"/>
+            </a:solidFill>
+          </a:ln>
+        </p:spPr>
+        <p:txBody>
+          <a:bodyPr wrap="none" rtlCol="0" anchor="ctr" anchorCtr="1">
+            <a:spAutoFit/>
+          </a:bodyPr>
+          <a:lstStyle/>
+          <a:p>
+            <a:r>
+              <a:rPr lang="en-US" dirty="0" smtClean="0"/>
+              <a:t>Version</a:t>
+            </a:r>
+          </a:p>
+          <a:p>
+            <a:r>
+              <a:rPr lang="en-US" dirty="0" smtClean="0"/>
+              <a:t>Control</a:t>
+            </a:r>
+            <a:endParaRPr lang="en-US" dirty="0"/>
+          </a:p>
+        </p:txBody>
+      </p:sp>
+      <p:sp>
+        <p:nvSpPr>
+          <p:cNvPr id="65" name="TextBox 64"/>
+          <p:cNvSpPr txBox="1"/>
+          <p:nvPr/>
+        </p:nvSpPr>
+        <p:spPr>
+          <a:xfrm>
+            <a:off x="10055595" y="3580928"/>
+            <a:ext cx="970394" cy="646331"/>
+          </a:xfrm>
+          <a:prstGeom prst="rect">
+            <a:avLst/>
+          </a:prstGeom>
+          <a:noFill/>
+          <a:ln>
+            <a:solidFill>
+              <a:schemeClr val="bg2"/>
+            </a:solidFill>
+          </a:ln>
+        </p:spPr>
+        <p:txBody>
+          <a:bodyPr wrap="none" rtlCol="0" anchor="ctr" anchorCtr="1">
+            <a:spAutoFit/>
+          </a:bodyPr>
+          <a:lstStyle/>
+          <a:p>
+            <a:r>
+              <a:rPr lang="en-US" dirty="0" smtClean="0"/>
+              <a:t>Get &amp;</a:t>
+            </a:r>
+          </a:p>
+          <a:p>
+            <a:r>
+              <a:rPr lang="en-US" dirty="0" smtClean="0"/>
+              <a:t>Set Data</a:t>
+            </a:r>
+            <a:endParaRPr lang="en-US" dirty="0"/>
           </a:p>
         </p:txBody>
       </p:sp>
@@ -5432,29 +6101,43 @@
           <a:bodyPr/>
           <a:lstStyle/>
           <a:p>
-            <a:endParaRPr lang="en-US"/>
-          </a:p>
-        </p:txBody>
-      </p:sp>
-      <p:sp>
-        <p:nvSpPr>
-          <p:cNvPr id="3" name="Content Placeholder 2"/>
-          <p:cNvSpPr>
-            <a:spLocks noGrp="1"/>
-          </p:cNvSpPr>
+            <a:r>
+              <a:rPr lang="en-US" dirty="0" smtClean="0"/>
+              <a:t>Process: Design</a:t>
+            </a:r>
+            <a:endParaRPr lang="en-US" dirty="0"/>
+          </a:p>
+        </p:txBody>
+      </p:sp>
+      <p:pic>
+        <p:nvPicPr>
+          <p:cNvPr id="4" name="Content Placeholder 3"/>
+          <p:cNvPicPr>
+            <a:picLocks noGrp="1" noChangeAspect="1"/>
+          </p:cNvPicPr>
           <p:nvPr>
             <p:ph sz="quarter" idx="1"/>
           </p:nvPr>
-        </p:nvSpPr>
-        <p:spPr/>
-        <p:txBody>
-          <a:bodyPr/>
-          <a:lstStyle/>
-          <a:p>
-            <a:endParaRPr lang="en-US"/>
-          </a:p>
-        </p:txBody>
-      </p:sp>
+        </p:nvPicPr>
+        <p:blipFill>
+          <a:blip r:embed="rId2">
+            <a:extLst>
+              <a:ext uri="{28A0092B-C50C-407E-A947-70E740481C1C}">
+                <a14:useLocalDpi xmlns:a14="http://schemas.microsoft.com/office/drawing/2010/main" val="0"/>
+              </a:ext>
+            </a:extLst>
+          </a:blip>
+          <a:stretch>
+            <a:fillRect/>
+          </a:stretch>
+        </p:blipFill>
+        <p:spPr>
+          <a:xfrm>
+            <a:off x="1219200" y="1417638"/>
+            <a:ext cx="10206182" cy="5181600"/>
+          </a:xfrm>
+        </p:spPr>
+      </p:pic>
     </p:spTree>
     <p:extLst>
       <p:ext uri="{BB962C8B-B14F-4D97-AF65-F5344CB8AC3E}">
@@ -5519,29 +6202,43 @@
           <a:bodyPr/>
           <a:lstStyle/>
           <a:p>
-            <a:endParaRPr lang="en-US"/>
-          </a:p>
-        </p:txBody>
-      </p:sp>
-      <p:sp>
-        <p:nvSpPr>
-          <p:cNvPr id="3" name="Content Placeholder 2"/>
-          <p:cNvSpPr>
-            <a:spLocks noGrp="1"/>
-          </p:cNvSpPr>
+            <a:r>
+              <a:rPr lang="en-US" dirty="0" smtClean="0"/>
+              <a:t>Process: React Native (Implement)</a:t>
+            </a:r>
+            <a:endParaRPr lang="en-US" dirty="0"/>
+          </a:p>
+        </p:txBody>
+      </p:sp>
+      <p:pic>
+        <p:nvPicPr>
+          <p:cNvPr id="4" name="Content Placeholder 3"/>
+          <p:cNvPicPr>
+            <a:picLocks noGrp="1" noChangeAspect="1"/>
+          </p:cNvPicPr>
           <p:nvPr>
             <p:ph sz="quarter" idx="1"/>
           </p:nvPr>
-        </p:nvSpPr>
-        <p:spPr/>
-        <p:txBody>
-          <a:bodyPr/>
-          <a:lstStyle/>
-          <a:p>
-            <a:endParaRPr lang="en-US"/>
-          </a:p>
-        </p:txBody>
-      </p:sp>
+        </p:nvPicPr>
+        <p:blipFill>
+          <a:blip r:embed="rId2">
+            <a:extLst>
+              <a:ext uri="{28A0092B-C50C-407E-A947-70E740481C1C}">
+                <a14:useLocalDpi xmlns:a14="http://schemas.microsoft.com/office/drawing/2010/main" val="0"/>
+              </a:ext>
+            </a:extLst>
+          </a:blip>
+          <a:stretch>
+            <a:fillRect/>
+          </a:stretch>
+        </p:blipFill>
+        <p:spPr>
+          <a:xfrm>
+            <a:off x="1219200" y="1323509"/>
+            <a:ext cx="10461812" cy="5280724"/>
+          </a:xfrm>
+        </p:spPr>
+      </p:pic>
     </p:spTree>
     <p:extLst>
       <p:ext uri="{BB962C8B-B14F-4D97-AF65-F5344CB8AC3E}">
@@ -5608,7 +6305,7 @@
           <a:p>
             <a:r>
               <a:rPr lang="en-US" dirty="0" smtClean="0"/>
-              <a:t>Project Management</a:t>
+              <a:t>Process: React Native (Generate) </a:t>
             </a:r>
             <a:endParaRPr lang="en-US" dirty="0"/>
           </a:p>
@@ -5629,14 +6326,14 @@
           <a:bodyPr/>
           <a:lstStyle/>
           <a:p>
-            <a:endParaRPr lang="en-US" dirty="0"/>
+            <a:endParaRPr lang="en-US"/>
           </a:p>
         </p:txBody>
       </p:sp>
     </p:spTree>
     <p:extLst>
       <p:ext uri="{BB962C8B-B14F-4D97-AF65-F5344CB8AC3E}">
-        <p14:creationId xmlns:p14="http://schemas.microsoft.com/office/powerpoint/2010/main" val="4022182114"/>
+        <p14:creationId xmlns:p14="http://schemas.microsoft.com/office/powerpoint/2010/main" val="2830357141"/>
       </p:ext>
     </p:extLst>
   </p:cSld>
@@ -5699,7 +6396,7 @@
           <a:p>
             <a:r>
               <a:rPr lang="en-US" dirty="0" smtClean="0"/>
-              <a:t>What We Liked</a:t>
+              <a:t>Process: Expo (Display)</a:t>
             </a:r>
             <a:endParaRPr lang="en-US" dirty="0"/>
           </a:p>
@@ -5717,60 +6414,17 @@
         </p:nvSpPr>
         <p:spPr/>
         <p:txBody>
-          <a:bodyPr>
-            <a:normAutofit/>
-          </a:bodyPr>
-          <a:lstStyle/>
-          <a:p>
-            <a:r>
-              <a:rPr lang="en-US" sz="3800" dirty="0" smtClean="0"/>
-              <a:t>Group collaboration through </a:t>
-            </a:r>
-            <a:r>
-              <a:rPr lang="en-US" sz="3800" dirty="0" err="1" smtClean="0"/>
-              <a:t>Git</a:t>
-            </a:r>
-            <a:endParaRPr lang="en-US" sz="3800" dirty="0"/>
-          </a:p>
-          <a:p>
-            <a:r>
-              <a:rPr lang="en-US" sz="3800" dirty="0" smtClean="0"/>
-              <a:t>Watching our apps to be interactive</a:t>
-            </a:r>
-          </a:p>
-          <a:p>
-            <a:r>
-              <a:rPr lang="en-US" sz="3800" dirty="0" smtClean="0"/>
-              <a:t>Encouraging environment</a:t>
-            </a:r>
-          </a:p>
-          <a:p>
-            <a:r>
-              <a:rPr lang="en-US" sz="3800" dirty="0" smtClean="0"/>
-              <a:t>Professional development process</a:t>
-            </a:r>
-          </a:p>
-          <a:p>
-            <a:r>
-              <a:rPr lang="en-US" sz="3800" dirty="0" smtClean="0"/>
-              <a:t>Smooth compatible schedule</a:t>
-            </a:r>
-          </a:p>
-          <a:p>
-            <a:r>
-              <a:rPr lang="en-US" sz="3800" dirty="0" smtClean="0"/>
-              <a:t>Labor Distribution</a:t>
-            </a:r>
-          </a:p>
-          <a:p>
-            <a:endParaRPr lang="en-US" sz="3800" dirty="0"/>
+          <a:bodyPr/>
+          <a:lstStyle/>
+          <a:p>
+            <a:endParaRPr lang="en-US"/>
           </a:p>
         </p:txBody>
       </p:sp>
     </p:spTree>
     <p:extLst>
       <p:ext uri="{BB962C8B-B14F-4D97-AF65-F5344CB8AC3E}">
-        <p14:creationId xmlns:p14="http://schemas.microsoft.com/office/powerpoint/2010/main" val="3466992820"/>
+        <p14:creationId xmlns:p14="http://schemas.microsoft.com/office/powerpoint/2010/main" val="3755236817"/>
       </p:ext>
     </p:extLst>
   </p:cSld>
@@ -5833,7 +6487,7 @@
           <a:p>
             <a:r>
               <a:rPr lang="en-US" dirty="0" smtClean="0"/>
-              <a:t>What We Didn’t Like</a:t>
+              <a:t>Project Management</a:t>
             </a:r>
             <a:endParaRPr lang="en-US" dirty="0"/>
           </a:p>
@@ -5858,37 +6512,37 @@
           <a:p>
             <a:r>
               <a:rPr lang="en-US" sz="3800" dirty="0" smtClean="0"/>
-              <a:t>Compressed deadline (5 weeks – week 1 &amp; 5)</a:t>
+              <a:t>Engineering Method (e.g. planning poker)</a:t>
             </a:r>
           </a:p>
           <a:p>
             <a:r>
               <a:rPr lang="en-US" sz="3800" dirty="0" smtClean="0"/>
-              <a:t>React Native and its volatility </a:t>
+              <a:t>Scrum Meeting</a:t>
             </a:r>
           </a:p>
           <a:p>
             <a:r>
               <a:rPr lang="en-US" sz="3800" dirty="0" smtClean="0"/>
-              <a:t>Lack of documentation for React Native</a:t>
+              <a:t>Sprint Planning</a:t>
             </a:r>
           </a:p>
           <a:p>
             <a:r>
               <a:rPr lang="en-US" sz="3800" dirty="0" smtClean="0"/>
-              <a:t>Expo and debugging</a:t>
+              <a:t>Sprint Review</a:t>
             </a:r>
           </a:p>
           <a:p>
             <a:r>
               <a:rPr lang="en-US" sz="3800" dirty="0" smtClean="0"/>
-              <a:t>Occasional miscommunication</a:t>
+              <a:t>Communication</a:t>
             </a:r>
           </a:p>
           <a:p>
             <a:r>
               <a:rPr lang="en-US" sz="3800" dirty="0" smtClean="0"/>
-              <a:t>Physical SCRUM board (inconvenience)</a:t>
+              <a:t>Version Control</a:t>
             </a:r>
             <a:endParaRPr lang="en-US" sz="3800" dirty="0"/>
           </a:p>
@@ -5897,7 +6551,7 @@
     </p:spTree>
     <p:extLst>
       <p:ext uri="{BB962C8B-B14F-4D97-AF65-F5344CB8AC3E}">
-        <p14:creationId xmlns:p14="http://schemas.microsoft.com/office/powerpoint/2010/main" val="893934045"/>
+        <p14:creationId xmlns:p14="http://schemas.microsoft.com/office/powerpoint/2010/main" val="4022182114"/>
       </p:ext>
     </p:extLst>
   </p:cSld>
@@ -5955,81 +6609,83 @@
         </p:nvSpPr>
         <p:spPr/>
         <p:txBody>
+          <a:bodyPr/>
+          <a:lstStyle/>
+          <a:p>
+            <a:r>
+              <a:rPr lang="en-US" dirty="0" smtClean="0"/>
+              <a:t>What We Liked</a:t>
+            </a:r>
+            <a:endParaRPr lang="en-US" dirty="0"/>
+          </a:p>
+        </p:txBody>
+      </p:sp>
+      <p:sp>
+        <p:nvSpPr>
+          <p:cNvPr id="3" name="Content Placeholder 2"/>
+          <p:cNvSpPr>
+            <a:spLocks noGrp="1"/>
+          </p:cNvSpPr>
+          <p:nvPr>
+            <p:ph sz="quarter" idx="1"/>
+          </p:nvPr>
+        </p:nvSpPr>
+        <p:spPr/>
+        <p:txBody>
           <a:bodyPr>
             <a:normAutofit/>
           </a:bodyPr>
           <a:lstStyle/>
           <a:p>
             <a:r>
-              <a:rPr lang="en-US" dirty="0" smtClean="0"/>
-              <a:t>Learning Experience: Continue Doing</a:t>
-            </a:r>
-            <a:endParaRPr lang="en-US" dirty="0"/>
-          </a:p>
-        </p:txBody>
-      </p:sp>
-      <p:sp>
-        <p:nvSpPr>
-          <p:cNvPr id="3" name="Content Placeholder 2"/>
-          <p:cNvSpPr>
-            <a:spLocks noGrp="1"/>
-          </p:cNvSpPr>
-          <p:nvPr>
-            <p:ph sz="quarter" idx="1"/>
-          </p:nvPr>
-        </p:nvSpPr>
-        <p:spPr/>
-        <p:txBody>
-          <a:bodyPr>
-            <a:normAutofit/>
-          </a:bodyPr>
-          <a:lstStyle/>
-          <a:p>
-            <a:r>
               <a:rPr lang="en-US" sz="3800" dirty="0" smtClean="0"/>
-              <a:t>Frequent SCRUM meeting</a:t>
-            </a:r>
-            <a:endParaRPr lang="en-US" sz="3800" dirty="0"/>
-          </a:p>
-          <a:p>
-            <a:r>
-              <a:rPr lang="en-US" sz="3800" dirty="0" smtClean="0"/>
-              <a:t>Design first, then build</a:t>
-            </a:r>
-          </a:p>
-          <a:p>
-            <a:r>
-              <a:rPr lang="en-US" sz="3800" dirty="0" smtClean="0"/>
-              <a:t>Setting standard convention/guideline</a:t>
-            </a:r>
-            <a:endParaRPr lang="en-US" sz="3800" dirty="0"/>
-          </a:p>
-          <a:p>
-            <a:r>
-              <a:rPr lang="en-US" sz="3800" dirty="0" smtClean="0"/>
-              <a:t>Documenting code through comments</a:t>
-            </a:r>
-          </a:p>
-          <a:p>
-            <a:r>
-              <a:rPr lang="en-US" sz="3800" dirty="0" smtClean="0"/>
-              <a:t>Version control using </a:t>
+              <a:t>Group collaboration through </a:t>
             </a:r>
             <a:r>
               <a:rPr lang="en-US" sz="3800" dirty="0" err="1" smtClean="0"/>
               <a:t>Git</a:t>
             </a:r>
+            <a:endParaRPr lang="en-US" sz="3800" dirty="0"/>
+          </a:p>
+          <a:p>
             <a:r>
               <a:rPr lang="en-US" sz="3800" dirty="0" smtClean="0"/>
-              <a:t> (e.g. branching)</a:t>
-            </a:r>
+              <a:t>Watching our apps to be interactive</a:t>
+            </a:r>
+          </a:p>
+          <a:p>
+            <a:r>
+              <a:rPr lang="en-US" sz="3800" dirty="0" smtClean="0"/>
+              <a:t>Encouraging environment</a:t>
+            </a:r>
+          </a:p>
+          <a:p>
+            <a:r>
+              <a:rPr lang="en-US" sz="3800" dirty="0" smtClean="0"/>
+              <a:t>Professional development process</a:t>
+            </a:r>
+          </a:p>
+          <a:p>
+            <a:r>
+              <a:rPr lang="en-US" sz="3800" dirty="0" smtClean="0"/>
+              <a:t>Smooth compatible schedule</a:t>
+            </a:r>
+          </a:p>
+          <a:p>
+            <a:r>
+              <a:rPr lang="en-US" sz="3800" dirty="0" smtClean="0"/>
+              <a:t>Labor Distribution</a:t>
+            </a:r>
+          </a:p>
+          <a:p>
+            <a:endParaRPr lang="en-US" sz="3800" dirty="0"/>
           </a:p>
         </p:txBody>
       </p:sp>
     </p:spTree>
     <p:extLst>
       <p:ext uri="{BB962C8B-B14F-4D97-AF65-F5344CB8AC3E}">
-        <p14:creationId xmlns:p14="http://schemas.microsoft.com/office/powerpoint/2010/main" val="2881193930"/>
+        <p14:creationId xmlns:p14="http://schemas.microsoft.com/office/powerpoint/2010/main" val="3466992820"/>
       </p:ext>
     </p:extLst>
   </p:cSld>
@@ -6091,12 +6747,8 @@
           <a:lstStyle/>
           <a:p>
             <a:r>
-              <a:rPr lang="en-US" dirty="0"/>
-              <a:t>Learning Experience</a:t>
-            </a:r>
-            <a:r>
               <a:rPr lang="en-US" dirty="0" smtClean="0"/>
-              <a:t>: Stop Doing</a:t>
+              <a:t>What We Didn’t Like</a:t>
             </a:r>
             <a:endParaRPr lang="en-US" dirty="0"/>
           </a:p>
@@ -6114,47 +6766,53 @@
         </p:nvSpPr>
         <p:spPr/>
         <p:txBody>
-          <a:bodyPr/>
+          <a:bodyPr>
+            <a:normAutofit/>
+          </a:bodyPr>
           <a:lstStyle/>
           <a:p>
             <a:r>
               <a:rPr lang="en-US" sz="3800" dirty="0" smtClean="0"/>
-              <a:t>Stop using react native (or any unstable technology)</a:t>
+              <a:t>Compressed deadline (5 weeks – week 1 &amp; 5)</a:t>
             </a:r>
           </a:p>
           <a:p>
             <a:r>
               <a:rPr lang="en-US" sz="3800" dirty="0" smtClean="0"/>
-              <a:t>Meeting conflicts (e.g. missing, infrequent meeting, etc.)</a:t>
+              <a:t>React Native and its volatility </a:t>
             </a:r>
           </a:p>
           <a:p>
             <a:r>
               <a:rPr lang="en-US" sz="3800" dirty="0" smtClean="0"/>
-              <a:t>Individual development</a:t>
+              <a:t>Lack of documentation for React Native</a:t>
             </a:r>
           </a:p>
           <a:p>
             <a:r>
               <a:rPr lang="en-US" sz="3800" dirty="0" smtClean="0"/>
-              <a:t>Estimating other members progress</a:t>
+              <a:t>Expo and debugging</a:t>
             </a:r>
           </a:p>
           <a:p>
             <a:r>
               <a:rPr lang="en-US" sz="3800" dirty="0" smtClean="0"/>
-              <a:t>Forgetting to document code</a:t>
-            </a:r>
-          </a:p>
-          <a:p>
-            <a:endParaRPr lang="en-US" dirty="0"/>
+              <a:t>Occasional miscommunication</a:t>
+            </a:r>
+          </a:p>
+          <a:p>
+            <a:r>
+              <a:rPr lang="en-US" sz="3800" dirty="0" smtClean="0"/>
+              <a:t>Physical SCRUM board (inconvenience)</a:t>
+            </a:r>
+            <a:endParaRPr lang="en-US" sz="3800" dirty="0"/>
           </a:p>
         </p:txBody>
       </p:sp>
     </p:spTree>
     <p:extLst>
       <p:ext uri="{BB962C8B-B14F-4D97-AF65-F5344CB8AC3E}">
-        <p14:creationId xmlns:p14="http://schemas.microsoft.com/office/powerpoint/2010/main" val="3943640939"/>
+        <p14:creationId xmlns:p14="http://schemas.microsoft.com/office/powerpoint/2010/main" val="893934045"/>
       </p:ext>
     </p:extLst>
   </p:cSld>
@@ -6212,12 +6870,14 @@
         </p:nvSpPr>
         <p:spPr/>
         <p:txBody>
-          <a:bodyPr/>
+          <a:bodyPr>
+            <a:normAutofit/>
+          </a:bodyPr>
           <a:lstStyle/>
           <a:p>
             <a:r>
               <a:rPr lang="en-US" dirty="0" smtClean="0"/>
-              <a:t>Things We Wish We Could Have Done</a:t>
+              <a:t>Learning Experience: Continue Doing</a:t>
             </a:r>
             <a:endParaRPr lang="en-US" dirty="0"/>
           </a:p>
@@ -6235,27 +6895,56 @@
         </p:nvSpPr>
         <p:spPr/>
         <p:txBody>
-          <a:bodyPr/>
-          <a:lstStyle/>
-          <a:p>
-            <a:r>
-              <a:rPr lang="en-US" dirty="0" smtClean="0"/>
-              <a:t>Used </a:t>
-            </a:r>
-            <a:r>
-              <a:rPr lang="en-US" smtClean="0"/>
-              <a:t>different framework</a:t>
-            </a:r>
-          </a:p>
-          <a:p>
-            <a:endParaRPr lang="en-US"/>
+          <a:bodyPr>
+            <a:normAutofit/>
+          </a:bodyPr>
+          <a:lstStyle/>
+          <a:p>
+            <a:r>
+              <a:rPr lang="en-US" sz="3800" dirty="0" smtClean="0"/>
+              <a:t>Frequent SCRUM meeting</a:t>
+            </a:r>
+            <a:endParaRPr lang="en-US" sz="3800" dirty="0"/>
+          </a:p>
+          <a:p>
+            <a:r>
+              <a:rPr lang="en-US" sz="3800" dirty="0" smtClean="0"/>
+              <a:t>Design first, then build</a:t>
+            </a:r>
+          </a:p>
+          <a:p>
+            <a:r>
+              <a:rPr lang="en-US" sz="3800" dirty="0" smtClean="0"/>
+              <a:t>Setting standard convention/guideline</a:t>
+            </a:r>
+            <a:endParaRPr lang="en-US" sz="3800" dirty="0"/>
+          </a:p>
+          <a:p>
+            <a:r>
+              <a:rPr lang="en-US" sz="3800" dirty="0" smtClean="0"/>
+              <a:t>Documenting code through comments</a:t>
+            </a:r>
+          </a:p>
+          <a:p>
+            <a:r>
+              <a:rPr lang="en-US" sz="3800" dirty="0" smtClean="0"/>
+              <a:t>Version control using </a:t>
+            </a:r>
+            <a:r>
+              <a:rPr lang="en-US" sz="3800" dirty="0" err="1" smtClean="0"/>
+              <a:t>Git</a:t>
+            </a:r>
+            <a:r>
+              <a:rPr lang="en-US" sz="3800" dirty="0" smtClean="0"/>
+              <a:t> (e.g. branching)</a:t>
+            </a:r>
           </a:p>
         </p:txBody>
       </p:sp>
     </p:spTree>
     <p:extLst>
       <p:ext uri="{BB962C8B-B14F-4D97-AF65-F5344CB8AC3E}">
-        <p14:creationId xmlns:p14="http://schemas.microsoft.com/office/powerpoint/2010/main" val="1981294728"/>
+        <p14:creationId xmlns:p14="http://schemas.microsoft.com/office/powerpoint/2010/main" val="2881193930"/>
       </p:ext>
     </p:extLst>
   </p:cSld>
@@ -6274,6 +6963,13 @@
       </p:transition>
     </mc:Fallback>
   </mc:AlternateContent>
+  <p:timing>
+    <p:tnLst>
+      <p:par>
+        <p:cTn id="1" dur="indefinite" restart="never" nodeType="tmRoot"/>
+      </p:par>
+    </p:tnLst>
+  </p:timing>
 </p:sld>
 </file>
 
@@ -6376,6 +7072,267 @@
     <p:extLst>
       <p:ext uri="{BB962C8B-B14F-4D97-AF65-F5344CB8AC3E}">
         <p14:creationId xmlns:p14="http://schemas.microsoft.com/office/powerpoint/2010/main" val="453256951"/>
+      </p:ext>
+    </p:extLst>
+  </p:cSld>
+  <p:clrMapOvr>
+    <a:masterClrMapping/>
+  </p:clrMapOvr>
+  <mc:AlternateContent xmlns:mc="http://schemas.openxmlformats.org/markup-compatibility/2006" xmlns:p14="http://schemas.microsoft.com/office/powerpoint/2010/main">
+    <mc:Choice Requires="p14">
+      <p:transition spd="med" p14:dur="700">
+        <p:fade/>
+      </p:transition>
+    </mc:Choice>
+    <mc:Fallback xmlns="">
+      <p:transition spd="med">
+        <p:fade/>
+      </p:transition>
+    </mc:Fallback>
+  </mc:AlternateContent>
+  <p:timing>
+    <p:tnLst>
+      <p:par>
+        <p:cTn id="1" dur="indefinite" restart="never" nodeType="tmRoot"/>
+      </p:par>
+    </p:tnLst>
+  </p:timing>
+</p:sld>
+</file>
+
+<file path=ppt/slides/slide20.xml><?xml version="1.0" encoding="utf-8"?>
+<p:sld xmlns:a="http://schemas.openxmlformats.org/drawingml/2006/main" xmlns:r="http://schemas.openxmlformats.org/officeDocument/2006/relationships" xmlns:p="http://schemas.openxmlformats.org/presentationml/2006/main">
+  <p:cSld>
+    <p:spTree>
+      <p:nvGrpSpPr>
+        <p:cNvPr id="1" name=""/>
+        <p:cNvGrpSpPr/>
+        <p:nvPr/>
+      </p:nvGrpSpPr>
+      <p:grpSpPr>
+        <a:xfrm>
+          <a:off x="0" y="0"/>
+          <a:ext cx="0" cy="0"/>
+          <a:chOff x="0" y="0"/>
+          <a:chExt cx="0" cy="0"/>
+        </a:xfrm>
+      </p:grpSpPr>
+      <p:sp>
+        <p:nvSpPr>
+          <p:cNvPr id="2" name="Title 1"/>
+          <p:cNvSpPr>
+            <a:spLocks noGrp="1"/>
+          </p:cNvSpPr>
+          <p:nvPr>
+            <p:ph type="title"/>
+          </p:nvPr>
+        </p:nvSpPr>
+        <p:spPr/>
+        <p:txBody>
+          <a:bodyPr/>
+          <a:lstStyle/>
+          <a:p>
+            <a:r>
+              <a:rPr lang="en-US" dirty="0"/>
+              <a:t>Learning Experience</a:t>
+            </a:r>
+            <a:r>
+              <a:rPr lang="en-US" dirty="0" smtClean="0"/>
+              <a:t>: Stop Doing</a:t>
+            </a:r>
+            <a:endParaRPr lang="en-US" dirty="0"/>
+          </a:p>
+        </p:txBody>
+      </p:sp>
+      <p:sp>
+        <p:nvSpPr>
+          <p:cNvPr id="3" name="Content Placeholder 2"/>
+          <p:cNvSpPr>
+            <a:spLocks noGrp="1"/>
+          </p:cNvSpPr>
+          <p:nvPr>
+            <p:ph sz="quarter" idx="1"/>
+          </p:nvPr>
+        </p:nvSpPr>
+        <p:spPr/>
+        <p:txBody>
+          <a:bodyPr/>
+          <a:lstStyle/>
+          <a:p>
+            <a:r>
+              <a:rPr lang="en-US" sz="3800" dirty="0" smtClean="0"/>
+              <a:t>Stop using react native (or any unstable technology)</a:t>
+            </a:r>
+          </a:p>
+          <a:p>
+            <a:r>
+              <a:rPr lang="en-US" sz="3800" dirty="0" smtClean="0"/>
+              <a:t>Meeting conflicts (e.g. missing, infrequent meeting, etc.)</a:t>
+            </a:r>
+          </a:p>
+          <a:p>
+            <a:r>
+              <a:rPr lang="en-US" sz="3800" dirty="0" smtClean="0"/>
+              <a:t>Individual development</a:t>
+            </a:r>
+          </a:p>
+          <a:p>
+            <a:r>
+              <a:rPr lang="en-US" sz="3800" dirty="0" smtClean="0"/>
+              <a:t>Estimating other members progress</a:t>
+            </a:r>
+          </a:p>
+          <a:p>
+            <a:r>
+              <a:rPr lang="en-US" sz="3800" dirty="0" smtClean="0"/>
+              <a:t>Forgetting to document code</a:t>
+            </a:r>
+          </a:p>
+          <a:p>
+            <a:endParaRPr lang="en-US" dirty="0"/>
+          </a:p>
+        </p:txBody>
+      </p:sp>
+    </p:spTree>
+    <p:extLst>
+      <p:ext uri="{BB962C8B-B14F-4D97-AF65-F5344CB8AC3E}">
+        <p14:creationId xmlns:p14="http://schemas.microsoft.com/office/powerpoint/2010/main" val="3943640939"/>
+      </p:ext>
+    </p:extLst>
+  </p:cSld>
+  <p:clrMapOvr>
+    <a:masterClrMapping/>
+  </p:clrMapOvr>
+  <mc:AlternateContent xmlns:mc="http://schemas.openxmlformats.org/markup-compatibility/2006" xmlns:p14="http://schemas.microsoft.com/office/powerpoint/2010/main">
+    <mc:Choice Requires="p14">
+      <p:transition spd="med" p14:dur="700">
+        <p:fade/>
+      </p:transition>
+    </mc:Choice>
+    <mc:Fallback xmlns="">
+      <p:transition spd="med">
+        <p:fade/>
+      </p:transition>
+    </mc:Fallback>
+  </mc:AlternateContent>
+  <p:timing>
+    <p:tnLst>
+      <p:par>
+        <p:cTn id="1" dur="indefinite" restart="never" nodeType="tmRoot"/>
+      </p:par>
+    </p:tnLst>
+  </p:timing>
+</p:sld>
+</file>
+
+<file path=ppt/slides/slide21.xml><?xml version="1.0" encoding="utf-8"?>
+<p:sld xmlns:a="http://schemas.openxmlformats.org/drawingml/2006/main" xmlns:r="http://schemas.openxmlformats.org/officeDocument/2006/relationships" xmlns:p="http://schemas.openxmlformats.org/presentationml/2006/main">
+  <p:cSld>
+    <p:spTree>
+      <p:nvGrpSpPr>
+        <p:cNvPr id="1" name=""/>
+        <p:cNvGrpSpPr/>
+        <p:nvPr/>
+      </p:nvGrpSpPr>
+      <p:grpSpPr>
+        <a:xfrm>
+          <a:off x="0" y="0"/>
+          <a:ext cx="0" cy="0"/>
+          <a:chOff x="0" y="0"/>
+          <a:chExt cx="0" cy="0"/>
+        </a:xfrm>
+      </p:grpSpPr>
+      <p:sp>
+        <p:nvSpPr>
+          <p:cNvPr id="2" name="Title 1"/>
+          <p:cNvSpPr>
+            <a:spLocks noGrp="1"/>
+          </p:cNvSpPr>
+          <p:nvPr>
+            <p:ph type="title"/>
+          </p:nvPr>
+        </p:nvSpPr>
+        <p:spPr/>
+        <p:txBody>
+          <a:bodyPr/>
+          <a:lstStyle/>
+          <a:p>
+            <a:r>
+              <a:rPr lang="en-US" dirty="0" smtClean="0"/>
+              <a:t>Things We Wish We Could Have Done</a:t>
+            </a:r>
+            <a:endParaRPr lang="en-US" dirty="0"/>
+          </a:p>
+        </p:txBody>
+      </p:sp>
+      <p:sp>
+        <p:nvSpPr>
+          <p:cNvPr id="3" name="Content Placeholder 2"/>
+          <p:cNvSpPr>
+            <a:spLocks noGrp="1"/>
+          </p:cNvSpPr>
+          <p:nvPr>
+            <p:ph sz="quarter" idx="1"/>
+          </p:nvPr>
+        </p:nvSpPr>
+        <p:spPr/>
+        <p:txBody>
+          <a:bodyPr>
+            <a:normAutofit/>
+          </a:bodyPr>
+          <a:lstStyle/>
+          <a:p>
+            <a:r>
+              <a:rPr lang="en-US" sz="3800" dirty="0" smtClean="0"/>
+              <a:t>Used different </a:t>
+            </a:r>
+            <a:r>
+              <a:rPr lang="en-US" sz="3800" dirty="0" smtClean="0"/>
+              <a:t>framework/Start Over</a:t>
+            </a:r>
+          </a:p>
+          <a:p>
+            <a:r>
+              <a:rPr lang="en-US" sz="3800" dirty="0" smtClean="0"/>
+              <a:t>Nationwide Search</a:t>
+            </a:r>
+          </a:p>
+          <a:p>
+            <a:r>
+              <a:rPr lang="en-US" sz="3800" dirty="0" smtClean="0"/>
+              <a:t>Fix critical bugs</a:t>
+            </a:r>
+          </a:p>
+          <a:p>
+            <a:r>
+              <a:rPr lang="en-US" sz="3800" dirty="0" smtClean="0"/>
+              <a:t>Info on how to register</a:t>
+            </a:r>
+          </a:p>
+          <a:p>
+            <a:r>
+              <a:rPr lang="en-US" sz="3800" dirty="0" smtClean="0"/>
+              <a:t>View House of Representative members</a:t>
+            </a:r>
+          </a:p>
+          <a:p>
+            <a:r>
+              <a:rPr lang="en-US" sz="3800" dirty="0" smtClean="0"/>
+              <a:t>Auto TL;DR</a:t>
+            </a:r>
+          </a:p>
+          <a:p>
+            <a:endParaRPr lang="en-US" sz="3800" dirty="0" smtClean="0"/>
+          </a:p>
+          <a:p>
+            <a:endParaRPr lang="en-US" sz="3800" dirty="0"/>
+          </a:p>
+        </p:txBody>
+      </p:sp>
+    </p:spTree>
+    <p:extLst>
+      <p:ext uri="{BB962C8B-B14F-4D97-AF65-F5344CB8AC3E}">
+        <p14:creationId xmlns:p14="http://schemas.microsoft.com/office/powerpoint/2010/main" val="1981294728"/>
       </p:ext>
     </p:extLst>
   </p:cSld>
@@ -6610,7 +7567,23 @@
           <a:p>
             <a:r>
               <a:rPr lang="en-US" sz="3800" dirty="0" smtClean="0"/>
-              <a:t>We were able to pull information from our database</a:t>
+              <a:t>We were able to pull information from our </a:t>
+            </a:r>
+            <a:r>
+              <a:rPr lang="en-US" sz="3800" dirty="0" smtClean="0"/>
+              <a:t>database</a:t>
+            </a:r>
+          </a:p>
+          <a:p>
+            <a:r>
+              <a:rPr lang="en-US" sz="3800" dirty="0" smtClean="0"/>
+              <a:t>Take input from users</a:t>
+            </a:r>
+          </a:p>
+          <a:p>
+            <a:r>
+              <a:rPr lang="en-US" sz="3800" dirty="0" smtClean="0"/>
+              <a:t>Display candidate’s information</a:t>
             </a:r>
             <a:endParaRPr lang="en-US" sz="3800" dirty="0"/>
           </a:p>

</xml_diff>